<commit_message>
rearranged lessons for flow
</commit_message>
<xml_diff>
--- a/Instructor-Led/Module5/Lessons/Module5_Lesson4 Spark MLlib Basic Statistics.pptx
+++ b/Instructor-Led/Module5/Lessons/Module5_Lesson4 Spark MLlib Basic Statistics.pptx
@@ -135,7 +135,7 @@
   </p:defaultTextStyle>
   <p:extLst>
     <p:ext uri="{EFAFB233-063F-42B5-8137-9DF3F51BA10A}">
-      <p15:sldGuideLst xmlns:p15="http://schemas.microsoft.com/office/powerpoint/2012/main" xmlns=""/>
+      <p15:sldGuideLst xmlns="" xmlns:p15="http://schemas.microsoft.com/office/powerpoint/2012/main"/>
     </p:ext>
   </p:extLst>
 </p:presentation>
@@ -304,7 +304,7 @@
             <a:fld id="{49B60EF2-7028-489F-85D8-FE86CD7CF2A0}" type="datetimeFigureOut">
               <a:rPr lang="en-US" smtClean="0"/>
               <a:pPr/>
-              <a:t>6/8/16</a:t>
+              <a:t>6/27/16</a:t>
             </a:fld>
             <a:endParaRPr lang="en-US"/>
           </a:p>
@@ -4584,7 +4584,7 @@
             <a:fld id="{0459C166-16D3-4A25-A2F8-C51E0E346B22}" type="datetimeFigureOut">
               <a:rPr lang="en-US" smtClean="0"/>
               <a:pPr/>
-              <a:t>6/8/16</a:t>
+              <a:t>6/27/16</a:t>
             </a:fld>
             <a:endParaRPr lang="en-US"/>
           </a:p>
@@ -4950,7 +4950,7 @@
             <a:fld id="{0459C166-16D3-4A25-A2F8-C51E0E346B22}" type="datetimeFigureOut">
               <a:rPr lang="en-US" smtClean="0"/>
               <a:pPr/>
-              <a:t>6/8/16</a:t>
+              <a:t>6/27/16</a:t>
             </a:fld>
             <a:endParaRPr lang="en-US"/>
           </a:p>
@@ -5069,7 +5069,7 @@
             <a:fld id="{0459C166-16D3-4A25-A2F8-C51E0E346B22}" type="datetimeFigureOut">
               <a:rPr lang="en-US" smtClean="0"/>
               <a:pPr/>
-              <a:t>6/8/16</a:t>
+              <a:t>6/27/16</a:t>
             </a:fld>
             <a:endParaRPr lang="en-US"/>
           </a:p>
@@ -5166,7 +5166,7 @@
             <a:fld id="{0459C166-16D3-4A25-A2F8-C51E0E346B22}" type="datetimeFigureOut">
               <a:rPr lang="en-US" smtClean="0"/>
               <a:pPr/>
-              <a:t>6/8/16</a:t>
+              <a:t>6/27/16</a:t>
             </a:fld>
             <a:endParaRPr lang="en-US"/>
           </a:p>
@@ -5443,7 +5443,7 @@
             <a:fld id="{0459C166-16D3-4A25-A2F8-C51E0E346B22}" type="datetimeFigureOut">
               <a:rPr lang="en-US" smtClean="0"/>
               <a:pPr/>
-              <a:t>6/8/16</a:t>
+              <a:t>6/27/16</a:t>
             </a:fld>
             <a:endParaRPr lang="en-US"/>
           </a:p>
@@ -5697,7 +5697,7 @@
             <a:fld id="{0459C166-16D3-4A25-A2F8-C51E0E346B22}" type="datetimeFigureOut">
               <a:rPr lang="en-US" smtClean="0"/>
               <a:pPr/>
-              <a:t>6/8/16</a:t>
+              <a:t>6/27/16</a:t>
             </a:fld>
             <a:endParaRPr lang="en-US"/>
           </a:p>
@@ -5867,7 +5867,7 @@
             <a:fld id="{0459C166-16D3-4A25-A2F8-C51E0E346B22}" type="datetimeFigureOut">
               <a:rPr lang="en-US" smtClean="0"/>
               <a:pPr/>
-              <a:t>6/8/16</a:t>
+              <a:t>6/27/16</a:t>
             </a:fld>
             <a:endParaRPr lang="en-US"/>
           </a:p>
@@ -6047,7 +6047,7 @@
             <a:fld id="{0459C166-16D3-4A25-A2F8-C51E0E346B22}" type="datetimeFigureOut">
               <a:rPr lang="en-US" smtClean="0"/>
               <a:pPr/>
-              <a:t>6/8/16</a:t>
+              <a:t>6/27/16</a:t>
             </a:fld>
             <a:endParaRPr lang="en-US"/>
           </a:p>
@@ -6217,7 +6217,7 @@
             <a:fld id="{0459C166-16D3-4A25-A2F8-C51E0E346B22}" type="datetimeFigureOut">
               <a:rPr lang="en-US" smtClean="0"/>
               <a:pPr/>
-              <a:t>6/8/16</a:t>
+              <a:t>6/27/16</a:t>
             </a:fld>
             <a:endParaRPr lang="en-US"/>
           </a:p>
@@ -6482,7 +6482,7 @@
             <a:fld id="{0459C166-16D3-4A25-A2F8-C51E0E346B22}" type="datetimeFigureOut">
               <a:rPr lang="en-US" smtClean="0"/>
               <a:pPr/>
-              <a:t>6/8/16</a:t>
+              <a:t>6/27/16</a:t>
             </a:fld>
             <a:endParaRPr lang="en-US"/>
           </a:p>
@@ -6799,7 +6799,7 @@
             <a:fld id="{0459C166-16D3-4A25-A2F8-C51E0E346B22}" type="datetimeFigureOut">
               <a:rPr lang="en-US" smtClean="0"/>
               <a:pPr/>
-              <a:t>6/8/16</a:t>
+              <a:t>6/27/16</a:t>
             </a:fld>
             <a:endParaRPr lang="en-US"/>
           </a:p>
@@ -7078,7 +7078,7 @@
             <a:fld id="{0459C166-16D3-4A25-A2F8-C51E0E346B22}" type="datetimeFigureOut">
               <a:rPr lang="en-US" smtClean="0"/>
               <a:pPr/>
-              <a:t>6/8/16</a:t>
+              <a:t>6/27/16</a:t>
             </a:fld>
             <a:endParaRPr lang="en-US"/>
           </a:p>
@@ -8067,7 +8067,7 @@
             <a:fld id="{0459C166-16D3-4A25-A2F8-C51E0E346B22}" type="datetimeFigureOut">
               <a:rPr lang="en-US" smtClean="0"/>
               <a:pPr/>
-              <a:t>6/8/16</a:t>
+              <a:t>6/27/16</a:t>
             </a:fld>
             <a:endParaRPr lang="en-US"/>
           </a:p>
@@ -8280,7 +8280,7 @@
             <a:fld id="{0459C166-16D3-4A25-A2F8-C51E0E346B22}" type="datetimeFigureOut">
               <a:rPr lang="en-US" smtClean="0"/>
               <a:pPr/>
-              <a:t>6/8/16</a:t>
+              <a:t>6/27/16</a:t>
             </a:fld>
             <a:endParaRPr lang="en-US"/>
           </a:p>
@@ -14185,11 +14185,13 @@
               </a:pPr>
               <a:r>
                 <a:rPr lang="en-US" sz="2800" dirty="0" smtClean="0"/>
-                <a:t>How data types affect the functionality of the statistical methods</a:t>
+                <a:t>How data types affect the functionality of the statistical </a:t>
               </a:r>
-            </a:p>
-            <a:p>
-              <a:endParaRPr lang="en-US" sz="2800" dirty="0"/>
+              <a:r>
+                <a:rPr lang="en-US" sz="2800" dirty="0" smtClean="0"/>
+                <a:t>methods</a:t>
+              </a:r>
+              <a:endParaRPr lang="en-US" sz="2800" dirty="0" smtClean="0"/>
             </a:p>
           </p:txBody>
         </p:sp>
@@ -15983,7 +15985,7 @@
   <a:extraClrSchemeLst/>
   <a:extLst>
     <a:ext uri="{05A4C25C-085E-4340-85A3-A5531E510DB2}">
-      <thm15:themeFamily xmlns:thm15="http://schemas.microsoft.com/office/thememl/2012/main" xmlns="" name="Office Theme" id="{62F939B6-93AF-4DB8-9C6B-D6C7DFDC589F}" vid="{4A3C46E8-61CC-4603-A589-7422A47A8E4A}"/>
+      <thm15:themeFamily xmlns="" xmlns:thm15="http://schemas.microsoft.com/office/thememl/2012/main" name="Office Theme" id="{62F939B6-93AF-4DB8-9C6B-D6C7DFDC589F}" vid="{4A3C46E8-61CC-4603-A589-7422A47A8E4A}"/>
     </a:ext>
   </a:extLst>
 </a:theme>
@@ -16278,7 +16280,7 @@
   <a:extraClrSchemeLst/>
   <a:extLst>
     <a:ext uri="{05A4C25C-085E-4340-85A3-A5531E510DB2}">
-      <thm15:themeFamily xmlns:thm15="http://schemas.microsoft.com/office/thememl/2012/main" xmlns="" name="Office Theme" id="{62F939B6-93AF-4DB8-9C6B-D6C7DFDC589F}" vid="{4A3C46E8-61CC-4603-A589-7422A47A8E4A}"/>
+      <thm15:themeFamily xmlns="" xmlns:thm15="http://schemas.microsoft.com/office/thememl/2012/main" name="Office Theme" id="{62F939B6-93AF-4DB8-9C6B-D6C7DFDC589F}" vid="{4A3C46E8-61CC-4603-A589-7422A47A8E4A}"/>
     </a:ext>
   </a:extLst>
 </a:theme>

</xml_diff>